<commit_message>
Created new test classes
</commit_message>
<xml_diff>
--- a/2022-SPR/Week12.pptx
+++ b/2022-SPR/Week12.pptx
@@ -261,7 +261,7 @@
           <a:p>
             <a:fld id="{2B1919C7-6BC3-4736-AC32-A62C7B81C82C}" type="datetimeFigureOut">
               <a:rPr lang="en-US" smtClean="0"/>
-              <a:t>4/5/2022</a:t>
+              <a:t>4/6/2022</a:t>
             </a:fld>
             <a:endParaRPr lang="en-US"/>
           </a:p>
@@ -459,7 +459,7 @@
           <a:p>
             <a:fld id="{2B1919C7-6BC3-4736-AC32-A62C7B81C82C}" type="datetimeFigureOut">
               <a:rPr lang="en-US" smtClean="0"/>
-              <a:t>4/5/2022</a:t>
+              <a:t>4/6/2022</a:t>
             </a:fld>
             <a:endParaRPr lang="en-US"/>
           </a:p>
@@ -667,7 +667,7 @@
           <a:p>
             <a:fld id="{2B1919C7-6BC3-4736-AC32-A62C7B81C82C}" type="datetimeFigureOut">
               <a:rPr lang="en-US" smtClean="0"/>
-              <a:t>4/5/2022</a:t>
+              <a:t>4/6/2022</a:t>
             </a:fld>
             <a:endParaRPr lang="en-US"/>
           </a:p>
@@ -865,7 +865,7 @@
           <a:p>
             <a:fld id="{2B1919C7-6BC3-4736-AC32-A62C7B81C82C}" type="datetimeFigureOut">
               <a:rPr lang="en-US" smtClean="0"/>
-              <a:t>4/5/2022</a:t>
+              <a:t>4/6/2022</a:t>
             </a:fld>
             <a:endParaRPr lang="en-US"/>
           </a:p>
@@ -1140,7 +1140,7 @@
           <a:p>
             <a:fld id="{2B1919C7-6BC3-4736-AC32-A62C7B81C82C}" type="datetimeFigureOut">
               <a:rPr lang="en-US" smtClean="0"/>
-              <a:t>4/5/2022</a:t>
+              <a:t>4/6/2022</a:t>
             </a:fld>
             <a:endParaRPr lang="en-US"/>
           </a:p>
@@ -1405,7 +1405,7 @@
           <a:p>
             <a:fld id="{2B1919C7-6BC3-4736-AC32-A62C7B81C82C}" type="datetimeFigureOut">
               <a:rPr lang="en-US" smtClean="0"/>
-              <a:t>4/5/2022</a:t>
+              <a:t>4/6/2022</a:t>
             </a:fld>
             <a:endParaRPr lang="en-US"/>
           </a:p>
@@ -1817,7 +1817,7 @@
           <a:p>
             <a:fld id="{2B1919C7-6BC3-4736-AC32-A62C7B81C82C}" type="datetimeFigureOut">
               <a:rPr lang="en-US" smtClean="0"/>
-              <a:t>4/5/2022</a:t>
+              <a:t>4/6/2022</a:t>
             </a:fld>
             <a:endParaRPr lang="en-US"/>
           </a:p>
@@ -1958,7 +1958,7 @@
           <a:p>
             <a:fld id="{2B1919C7-6BC3-4736-AC32-A62C7B81C82C}" type="datetimeFigureOut">
               <a:rPr lang="en-US" smtClean="0"/>
-              <a:t>4/5/2022</a:t>
+              <a:t>4/6/2022</a:t>
             </a:fld>
             <a:endParaRPr lang="en-US"/>
           </a:p>
@@ -2071,7 +2071,7 @@
           <a:p>
             <a:fld id="{2B1919C7-6BC3-4736-AC32-A62C7B81C82C}" type="datetimeFigureOut">
               <a:rPr lang="en-US" smtClean="0"/>
-              <a:t>4/5/2022</a:t>
+              <a:t>4/6/2022</a:t>
             </a:fld>
             <a:endParaRPr lang="en-US"/>
           </a:p>
@@ -2382,7 +2382,7 @@
           <a:p>
             <a:fld id="{2B1919C7-6BC3-4736-AC32-A62C7B81C82C}" type="datetimeFigureOut">
               <a:rPr lang="en-US" smtClean="0"/>
-              <a:t>4/5/2022</a:t>
+              <a:t>4/6/2022</a:t>
             </a:fld>
             <a:endParaRPr lang="en-US"/>
           </a:p>
@@ -2670,7 +2670,7 @@
           <a:p>
             <a:fld id="{2B1919C7-6BC3-4736-AC32-A62C7B81C82C}" type="datetimeFigureOut">
               <a:rPr lang="en-US" smtClean="0"/>
-              <a:t>4/5/2022</a:t>
+              <a:t>4/6/2022</a:t>
             </a:fld>
             <a:endParaRPr lang="en-US"/>
           </a:p>
@@ -2911,7 +2911,7 @@
           <a:p>
             <a:fld id="{2B1919C7-6BC3-4736-AC32-A62C7B81C82C}" type="datetimeFigureOut">
               <a:rPr lang="en-US" smtClean="0"/>
-              <a:t>4/5/2022</a:t>
+              <a:t>4/6/2022</a:t>
             </a:fld>
             <a:endParaRPr lang="en-US"/>
           </a:p>
@@ -3497,19 +3497,7 @@
           <a:p>
             <a:r>
               <a:rPr lang="en-US" dirty="0"/>
-              <a:t>Adding a dependency injection and unit testing to </a:t>
-            </a:r>
-            <a:r>
-              <a:rPr lang="en-US" dirty="0">
-                <a:solidFill>
-                  <a:srgbClr val="FF0000"/>
-                </a:solidFill>
-              </a:rPr>
-              <a:t>last weeks</a:t>
-            </a:r>
-            <a:r>
-              <a:rPr lang="en-US" dirty="0"/>
-              <a:t> web site (Topic 3)</a:t>
+              <a:t>Adding a dependency injection and unit testing to any web site (Topic 3)</a:t>
             </a:r>
           </a:p>
         </p:txBody>

</xml_diff>